<commit_message>
Updated design docs and modified unit test to include Output Verification Module
</commit_message>
<xml_diff>
--- a/docs/SRS/SystemContextFigure.pptx
+++ b/docs/SRS/SystemContextFigure.pptx
@@ -7,7 +7,7 @@
   <p:sldIdLst>
     <p:sldId id="256" r:id="rId2"/>
   </p:sldIdLst>
-  <p:sldSz cx="9144000" cy="6858000" type="screen4x3"/>
+  <p:sldSz cx="12192000" cy="6858000"/>
   <p:notesSz cx="6858000" cy="9144000"/>
   <p:defaultTextStyle>
     <a:defPPr>
@@ -107,12 +107,12 @@
   <p:extLst>
     <p:ext uri="{EFAFB233-063F-42B5-8137-9DF3F51BA10A}">
       <p15:sldGuideLst xmlns:p15="http://schemas.microsoft.com/office/powerpoint/2012/main">
-        <p15:guide id="1" orient="horz" pos="2160">
+        <p15:guide id="1" orient="horz" pos="2160" userDrawn="1">
           <p15:clr>
             <a:srgbClr val="A4A3A4"/>
           </p15:clr>
         </p15:guide>
-        <p15:guide id="2" pos="2880">
+        <p15:guide id="2" pos="3840" userDrawn="1">
           <p15:clr>
             <a:srgbClr val="A4A3A4"/>
           </p15:clr>
@@ -152,8 +152,8 @@
         </p:nvSpPr>
         <p:spPr>
           <a:xfrm>
-            <a:off x="685800" y="2130425"/>
-            <a:ext cx="7772400" cy="1470025"/>
+            <a:off x="914400" y="2130426"/>
+            <a:ext cx="10363200" cy="1470025"/>
           </a:xfrm>
         </p:spPr>
         <p:txBody>
@@ -180,8 +180,8 @@
         </p:nvSpPr>
         <p:spPr>
           <a:xfrm>
-            <a:off x="1371600" y="3886200"/>
-            <a:ext cx="6400800" cy="1752600"/>
+            <a:off x="1828800" y="3886200"/>
+            <a:ext cx="8534400" cy="1752600"/>
           </a:xfrm>
         </p:spPr>
         <p:txBody>
@@ -304,7 +304,7 @@
           <a:p>
             <a:fld id="{779256A2-DE0C-7447-B687-786F38514E8C}" type="datetimeFigureOut">
               <a:rPr lang="en-US" smtClean="0"/>
-              <a:t>2/2/2025</a:t>
+              <a:t>4/14/2025</a:t>
             </a:fld>
             <a:endParaRPr lang="en-US"/>
           </a:p>
@@ -474,7 +474,7 @@
           <a:p>
             <a:fld id="{779256A2-DE0C-7447-B687-786F38514E8C}" type="datetimeFigureOut">
               <a:rPr lang="en-US" smtClean="0"/>
-              <a:t>2/2/2025</a:t>
+              <a:t>4/14/2025</a:t>
             </a:fld>
             <a:endParaRPr lang="en-US"/>
           </a:p>
@@ -564,8 +564,8 @@
         </p:nvSpPr>
         <p:spPr>
           <a:xfrm>
-            <a:off x="6629400" y="274638"/>
-            <a:ext cx="2057400" cy="5851525"/>
+            <a:off x="8839200" y="274639"/>
+            <a:ext cx="2743200" cy="5851525"/>
           </a:xfrm>
         </p:spPr>
         <p:txBody>
@@ -592,8 +592,8 @@
         </p:nvSpPr>
         <p:spPr>
           <a:xfrm>
-            <a:off x="457200" y="274638"/>
-            <a:ext cx="6019800" cy="5851525"/>
+            <a:off x="609600" y="274639"/>
+            <a:ext cx="8026400" cy="5851525"/>
           </a:xfrm>
         </p:spPr>
         <p:txBody>
@@ -654,7 +654,7 @@
           <a:p>
             <a:fld id="{779256A2-DE0C-7447-B687-786F38514E8C}" type="datetimeFigureOut">
               <a:rPr lang="en-US" smtClean="0"/>
-              <a:t>2/2/2025</a:t>
+              <a:t>4/14/2025</a:t>
             </a:fld>
             <a:endParaRPr lang="en-US"/>
           </a:p>
@@ -824,7 +824,7 @@
           <a:p>
             <a:fld id="{779256A2-DE0C-7447-B687-786F38514E8C}" type="datetimeFigureOut">
               <a:rPr lang="en-US" smtClean="0"/>
-              <a:t>2/2/2025</a:t>
+              <a:t>4/14/2025</a:t>
             </a:fld>
             <a:endParaRPr lang="en-US"/>
           </a:p>
@@ -914,8 +914,8 @@
         </p:nvSpPr>
         <p:spPr>
           <a:xfrm>
-            <a:off x="722313" y="4406900"/>
-            <a:ext cx="7772400" cy="1362075"/>
+            <a:off x="963084" y="4406901"/>
+            <a:ext cx="10363200" cy="1362075"/>
           </a:xfrm>
         </p:spPr>
         <p:txBody>
@@ -946,8 +946,8 @@
         </p:nvSpPr>
         <p:spPr>
           <a:xfrm>
-            <a:off x="722313" y="2906713"/>
-            <a:ext cx="7772400" cy="1500187"/>
+            <a:off x="963084" y="2906713"/>
+            <a:ext cx="10363200" cy="1500187"/>
           </a:xfrm>
         </p:spPr>
         <p:txBody>
@@ -1070,7 +1070,7 @@
           <a:p>
             <a:fld id="{779256A2-DE0C-7447-B687-786F38514E8C}" type="datetimeFigureOut">
               <a:rPr lang="en-US" smtClean="0"/>
-              <a:t>2/2/2025</a:t>
+              <a:t>4/14/2025</a:t>
             </a:fld>
             <a:endParaRPr lang="en-US"/>
           </a:p>
@@ -1183,8 +1183,8 @@
         </p:nvSpPr>
         <p:spPr>
           <a:xfrm>
-            <a:off x="457200" y="1600200"/>
-            <a:ext cx="4038600" cy="4525963"/>
+            <a:off x="609600" y="1600201"/>
+            <a:ext cx="5384800" cy="4525963"/>
           </a:xfrm>
         </p:spPr>
         <p:txBody>
@@ -1268,8 +1268,8 @@
         </p:nvSpPr>
         <p:spPr>
           <a:xfrm>
-            <a:off x="4648200" y="1600200"/>
-            <a:ext cx="4038600" cy="4525963"/>
+            <a:off x="6197600" y="1600201"/>
+            <a:ext cx="5384800" cy="4525963"/>
           </a:xfrm>
         </p:spPr>
         <p:txBody>
@@ -1358,7 +1358,7 @@
           <a:p>
             <a:fld id="{779256A2-DE0C-7447-B687-786F38514E8C}" type="datetimeFigureOut">
               <a:rPr lang="en-US" smtClean="0"/>
-              <a:t>2/2/2025</a:t>
+              <a:t>4/14/2025</a:t>
             </a:fld>
             <a:endParaRPr lang="en-US"/>
           </a:p>
@@ -1475,8 +1475,8 @@
         </p:nvSpPr>
         <p:spPr>
           <a:xfrm>
-            <a:off x="457200" y="1535113"/>
-            <a:ext cx="4040188" cy="639762"/>
+            <a:off x="609600" y="1535113"/>
+            <a:ext cx="5386917" cy="639762"/>
           </a:xfrm>
         </p:spPr>
         <p:txBody>
@@ -1540,8 +1540,8 @@
         </p:nvSpPr>
         <p:spPr>
           <a:xfrm>
-            <a:off x="457200" y="2174875"/>
-            <a:ext cx="4040188" cy="3951288"/>
+            <a:off x="609600" y="2174875"/>
+            <a:ext cx="5386917" cy="3951288"/>
           </a:xfrm>
         </p:spPr>
         <p:txBody>
@@ -1625,8 +1625,8 @@
         </p:nvSpPr>
         <p:spPr>
           <a:xfrm>
-            <a:off x="4645025" y="1535113"/>
-            <a:ext cx="4041775" cy="639762"/>
+            <a:off x="6193368" y="1535113"/>
+            <a:ext cx="5389033" cy="639762"/>
           </a:xfrm>
         </p:spPr>
         <p:txBody>
@@ -1690,8 +1690,8 @@
         </p:nvSpPr>
         <p:spPr>
           <a:xfrm>
-            <a:off x="4645025" y="2174875"/>
-            <a:ext cx="4041775" cy="3951288"/>
+            <a:off x="6193368" y="2174875"/>
+            <a:ext cx="5389033" cy="3951288"/>
           </a:xfrm>
         </p:spPr>
         <p:txBody>
@@ -1780,7 +1780,7 @@
           <a:p>
             <a:fld id="{779256A2-DE0C-7447-B687-786F38514E8C}" type="datetimeFigureOut">
               <a:rPr lang="en-US" smtClean="0"/>
-              <a:t>2/2/2025</a:t>
+              <a:t>4/14/2025</a:t>
             </a:fld>
             <a:endParaRPr lang="en-US"/>
           </a:p>
@@ -1898,7 +1898,7 @@
           <a:p>
             <a:fld id="{779256A2-DE0C-7447-B687-786F38514E8C}" type="datetimeFigureOut">
               <a:rPr lang="en-US" smtClean="0"/>
-              <a:t>2/2/2025</a:t>
+              <a:t>4/14/2025</a:t>
             </a:fld>
             <a:endParaRPr lang="en-US"/>
           </a:p>
@@ -1993,7 +1993,7 @@
           <a:p>
             <a:fld id="{779256A2-DE0C-7447-B687-786F38514E8C}" type="datetimeFigureOut">
               <a:rPr lang="en-US" smtClean="0"/>
-              <a:t>2/2/2025</a:t>
+              <a:t>4/14/2025</a:t>
             </a:fld>
             <a:endParaRPr lang="en-US"/>
           </a:p>
@@ -2083,8 +2083,8 @@
         </p:nvSpPr>
         <p:spPr>
           <a:xfrm>
-            <a:off x="457200" y="273050"/>
-            <a:ext cx="3008313" cy="1162050"/>
+            <a:off x="609601" y="273050"/>
+            <a:ext cx="4011084" cy="1162050"/>
           </a:xfrm>
         </p:spPr>
         <p:txBody>
@@ -2115,8 +2115,8 @@
         </p:nvSpPr>
         <p:spPr>
           <a:xfrm>
-            <a:off x="3575050" y="273050"/>
-            <a:ext cx="5111750" cy="5853113"/>
+            <a:off x="4766733" y="273051"/>
+            <a:ext cx="6815667" cy="5853113"/>
           </a:xfrm>
         </p:spPr>
         <p:txBody>
@@ -2200,8 +2200,8 @@
         </p:nvSpPr>
         <p:spPr>
           <a:xfrm>
-            <a:off x="457200" y="1435100"/>
-            <a:ext cx="3008313" cy="4691063"/>
+            <a:off x="609601" y="1435101"/>
+            <a:ext cx="4011084" cy="4691063"/>
           </a:xfrm>
         </p:spPr>
         <p:txBody>
@@ -2270,7 +2270,7 @@
           <a:p>
             <a:fld id="{779256A2-DE0C-7447-B687-786F38514E8C}" type="datetimeFigureOut">
               <a:rPr lang="en-US" smtClean="0"/>
-              <a:t>2/2/2025</a:t>
+              <a:t>4/14/2025</a:t>
             </a:fld>
             <a:endParaRPr lang="en-US"/>
           </a:p>
@@ -2360,8 +2360,8 @@
         </p:nvSpPr>
         <p:spPr>
           <a:xfrm>
-            <a:off x="1792288" y="4800600"/>
-            <a:ext cx="5486400" cy="566738"/>
+            <a:off x="2389717" y="4800600"/>
+            <a:ext cx="7315200" cy="566738"/>
           </a:xfrm>
         </p:spPr>
         <p:txBody>
@@ -2392,8 +2392,8 @@
         </p:nvSpPr>
         <p:spPr>
           <a:xfrm>
-            <a:off x="1792288" y="612775"/>
-            <a:ext cx="5486400" cy="4114800"/>
+            <a:off x="2389717" y="612775"/>
+            <a:ext cx="7315200" cy="4114800"/>
           </a:xfrm>
         </p:spPr>
         <p:txBody>
@@ -2453,8 +2453,8 @@
         </p:nvSpPr>
         <p:spPr>
           <a:xfrm>
-            <a:off x="1792288" y="5367338"/>
-            <a:ext cx="5486400" cy="804862"/>
+            <a:off x="2389717" y="5367338"/>
+            <a:ext cx="7315200" cy="804862"/>
           </a:xfrm>
         </p:spPr>
         <p:txBody>
@@ -2523,7 +2523,7 @@
           <a:p>
             <a:fld id="{779256A2-DE0C-7447-B687-786F38514E8C}" type="datetimeFigureOut">
               <a:rPr lang="en-US" smtClean="0"/>
-              <a:t>2/2/2025</a:t>
+              <a:t>4/14/2025</a:t>
             </a:fld>
             <a:endParaRPr lang="en-US"/>
           </a:p>
@@ -2618,8 +2618,8 @@
         </p:nvSpPr>
         <p:spPr>
           <a:xfrm>
-            <a:off x="457200" y="274638"/>
-            <a:ext cx="8229600" cy="1143000"/>
+            <a:off x="609600" y="274638"/>
+            <a:ext cx="10972800" cy="1143000"/>
           </a:xfrm>
           <a:prstGeom prst="rect">
             <a:avLst/>
@@ -2651,8 +2651,8 @@
         </p:nvSpPr>
         <p:spPr>
           <a:xfrm>
-            <a:off x="457200" y="1600200"/>
-            <a:ext cx="8229600" cy="4525963"/>
+            <a:off x="609600" y="1600201"/>
+            <a:ext cx="10972800" cy="4525963"/>
           </a:xfrm>
           <a:prstGeom prst="rect">
             <a:avLst/>
@@ -2713,8 +2713,8 @@
         </p:nvSpPr>
         <p:spPr>
           <a:xfrm>
-            <a:off x="457200" y="6356350"/>
-            <a:ext cx="2133600" cy="365125"/>
+            <a:off x="609600" y="6356351"/>
+            <a:ext cx="2844800" cy="365125"/>
           </a:xfrm>
           <a:prstGeom prst="rect">
             <a:avLst/>
@@ -2736,7 +2736,7 @@
           <a:p>
             <a:fld id="{779256A2-DE0C-7447-B687-786F38514E8C}" type="datetimeFigureOut">
               <a:rPr lang="en-US" smtClean="0"/>
-              <a:t>2/2/2025</a:t>
+              <a:t>4/14/2025</a:t>
             </a:fld>
             <a:endParaRPr lang="en-US"/>
           </a:p>
@@ -2754,8 +2754,8 @@
         </p:nvSpPr>
         <p:spPr>
           <a:xfrm>
-            <a:off x="3124200" y="6356350"/>
-            <a:ext cx="2895600" cy="365125"/>
+            <a:off x="4165600" y="6356351"/>
+            <a:ext cx="3860800" cy="365125"/>
           </a:xfrm>
           <a:prstGeom prst="rect">
             <a:avLst/>
@@ -2791,8 +2791,8 @@
         </p:nvSpPr>
         <p:spPr>
           <a:xfrm>
-            <a:off x="6553200" y="6356350"/>
-            <a:ext cx="2133600" cy="365125"/>
+            <a:off x="8737600" y="6356351"/>
+            <a:ext cx="2844800" cy="365125"/>
           </a:xfrm>
           <a:prstGeom prst="rect">
             <a:avLst/>
@@ -3113,62 +3113,85 @@
       </p:grpSpPr>
       <p:grpSp>
         <p:nvGrpSpPr>
-          <p:cNvPr id="10" name="Group 9"/>
-          <p:cNvGrpSpPr/>
+          <p:cNvPr id="4" name="Group 3">
+            <a:extLst>
+              <a:ext uri="{FF2B5EF4-FFF2-40B4-BE49-F238E27FC236}">
+                <a16:creationId xmlns:a16="http://schemas.microsoft.com/office/drawing/2014/main" id="{8C265F09-F5E3-B9BF-E3EA-93D6872E2094}"/>
+              </a:ext>
+            </a:extLst>
+          </p:cNvPr>
+          <p:cNvGrpSpPr>
+            <a:grpSpLocks noChangeAspect="1"/>
+          </p:cNvGrpSpPr>
           <p:nvPr/>
         </p:nvGrpSpPr>
         <p:grpSpPr>
           <a:xfrm>
-            <a:off x="189913" y="2874944"/>
-            <a:ext cx="8858711" cy="1246370"/>
-            <a:chOff x="189913" y="1721177"/>
-            <a:chExt cx="8858711" cy="1246370"/>
+            <a:off x="483721" y="2389073"/>
+            <a:ext cx="11101521" cy="3240982"/>
+            <a:chOff x="1727201" y="2662349"/>
+            <a:chExt cx="8706960" cy="2541913"/>
           </a:xfrm>
         </p:grpSpPr>
         <p:grpSp>
           <p:nvGrpSpPr>
-            <p:cNvPr id="6" name="Group 5"/>
+            <p:cNvPr id="2" name="Group 1">
+              <a:extLst>
+                <a:ext uri="{FF2B5EF4-FFF2-40B4-BE49-F238E27FC236}">
+                  <a16:creationId xmlns:a16="http://schemas.microsoft.com/office/drawing/2014/main" id="{E44B0E26-7A4B-B57D-EC61-9DCC4A4F1BE4}"/>
+                </a:ext>
+              </a:extLst>
+            </p:cNvPr>
             <p:cNvGrpSpPr/>
             <p:nvPr/>
           </p:nvGrpSpPr>
           <p:grpSpPr>
             <a:xfrm>
-              <a:off x="189913" y="1721177"/>
-              <a:ext cx="1246302" cy="1246370"/>
-              <a:chOff x="1436215" y="1721177"/>
-              <a:chExt cx="1246302" cy="1246370"/>
+              <a:off x="1727201" y="2662349"/>
+              <a:ext cx="8706960" cy="900000"/>
+              <a:chOff x="1389085" y="2064847"/>
+              <a:chExt cx="9708926" cy="900000"/>
             </a:xfrm>
           </p:grpSpPr>
           <p:sp>
             <p:nvSpPr>
-              <p:cNvPr id="4" name="Oval 3"/>
-              <p:cNvSpPr/>
+              <p:cNvPr id="3" name="Oval 2">
+                <a:extLst>
+                  <a:ext uri="{FF2B5EF4-FFF2-40B4-BE49-F238E27FC236}">
+                    <a16:creationId xmlns:a16="http://schemas.microsoft.com/office/drawing/2014/main" id="{7E1E62C0-B52B-172E-7D93-602E875D8B9A}"/>
+                  </a:ext>
+                </a:extLst>
+              </p:cNvPr>
+              <p:cNvSpPr>
+                <a:spLocks/>
+              </p:cNvSpPr>
               <p:nvPr/>
             </p:nvSpPr>
             <p:spPr>
               <a:xfrm>
-                <a:off x="1436215" y="1721177"/>
-                <a:ext cx="1246302" cy="1246370"/>
+                <a:off x="10184972" y="2105442"/>
+                <a:ext cx="913039" cy="818813"/>
               </a:xfrm>
               <a:prstGeom prst="ellipse">
                 <a:avLst/>
               </a:prstGeom>
               <a:noFill/>
-              <a:ln w="38100" cmpd="sng">
+              <a:ln>
                 <a:solidFill>
                   <a:schemeClr val="tx1"/>
                 </a:solidFill>
               </a:ln>
-              <a:effectLst/>
             </p:spPr>
             <p:style>
-              <a:lnRef idx="1">
-                <a:schemeClr val="accent1"/>
+              <a:lnRef idx="2">
+                <a:schemeClr val="accent1">
+                  <a:shade val="15000"/>
+                </a:schemeClr>
               </a:lnRef>
-              <a:fillRef idx="3">
+              <a:fillRef idx="1">
                 <a:schemeClr val="accent1"/>
               </a:fillRef>
-              <a:effectRef idx="2">
+              <a:effectRef idx="0">
                 <a:schemeClr val="accent1"/>
               </a:effectRef>
               <a:fontRef idx="minor">
@@ -3180,87 +3203,61 @@
               <a:lstStyle/>
               <a:p>
                 <a:pPr algn="ctr"/>
-                <a:endParaRPr lang="en-US"/>
+                <a:r>
+                  <a:rPr lang="en-US" dirty="0">
+                    <a:solidFill>
+                      <a:schemeClr val="tx1"/>
+                    </a:solidFill>
+                  </a:rPr>
+                  <a:t>User</a:t>
+                </a:r>
+                <a:endParaRPr lang="en-CA" dirty="0">
+                  <a:solidFill>
+                    <a:schemeClr val="tx1"/>
+                  </a:solidFill>
+                </a:endParaRPr>
               </a:p>
             </p:txBody>
           </p:sp>
           <p:sp>
             <p:nvSpPr>
-              <p:cNvPr id="5" name="TextBox 4"/>
-              <p:cNvSpPr txBox="1"/>
+              <p:cNvPr id="11" name="Oval 10">
+                <a:extLst>
+                  <a:ext uri="{FF2B5EF4-FFF2-40B4-BE49-F238E27FC236}">
+                    <a16:creationId xmlns:a16="http://schemas.microsoft.com/office/drawing/2014/main" id="{5397E6B0-822C-E0B4-58BB-A86207C0F47B}"/>
+                  </a:ext>
+                </a:extLst>
+              </p:cNvPr>
+              <p:cNvSpPr>
+                <a:spLocks noChangeAspect="1"/>
+              </p:cNvSpPr>
               <p:nvPr/>
             </p:nvSpPr>
             <p:spPr>
               <a:xfrm>
-                <a:off x="1673605" y="2052185"/>
-                <a:ext cx="762949" cy="461665"/>
-              </a:xfrm>
-              <a:prstGeom prst="rect">
-                <a:avLst/>
-              </a:prstGeom>
-              <a:noFill/>
-            </p:spPr>
-            <p:txBody>
-              <a:bodyPr wrap="none" rtlCol="0">
-                <a:spAutoFit/>
-              </a:bodyPr>
-              <a:lstStyle/>
-              <a:p>
-                <a:r>
-                  <a:rPr lang="en-US" sz="2400" dirty="0">
-                    <a:latin typeface="Times New Roman"/>
-                    <a:cs typeface="Times New Roman"/>
-                  </a:rPr>
-                  <a:t>User</a:t>
-                </a:r>
-              </a:p>
-            </p:txBody>
-          </p:sp>
-        </p:grpSp>
-        <p:grpSp>
-          <p:nvGrpSpPr>
-            <p:cNvPr id="7" name="Group 6"/>
-            <p:cNvGrpSpPr/>
-            <p:nvPr/>
-          </p:nvGrpSpPr>
-          <p:grpSpPr>
-            <a:xfrm>
-              <a:off x="7802322" y="1721177"/>
-              <a:ext cx="1246302" cy="1246370"/>
-              <a:chOff x="1436215" y="1721177"/>
-              <a:chExt cx="1246302" cy="1246370"/>
-            </a:xfrm>
-          </p:grpSpPr>
-          <p:sp>
-            <p:nvSpPr>
-              <p:cNvPr id="8" name="Oval 7"/>
-              <p:cNvSpPr/>
-              <p:nvPr/>
-            </p:nvSpPr>
-            <p:spPr>
-              <a:xfrm>
-                <a:off x="1436215" y="1721177"/>
-                <a:ext cx="1246302" cy="1246370"/>
+                <a:off x="1389085" y="2095567"/>
+                <a:ext cx="903526" cy="818813"/>
               </a:xfrm>
               <a:prstGeom prst="ellipse">
                 <a:avLst/>
               </a:prstGeom>
               <a:noFill/>
-              <a:ln w="38100" cmpd="sng">
+              <a:ln>
                 <a:solidFill>
                   <a:schemeClr val="tx1"/>
                 </a:solidFill>
               </a:ln>
-              <a:effectLst/>
             </p:spPr>
             <p:style>
-              <a:lnRef idx="1">
-                <a:schemeClr val="accent1"/>
+              <a:lnRef idx="2">
+                <a:schemeClr val="accent1">
+                  <a:shade val="15000"/>
+                </a:schemeClr>
               </a:lnRef>
-              <a:fillRef idx="3">
+              <a:fillRef idx="1">
                 <a:schemeClr val="accent1"/>
               </a:fillRef>
-              <a:effectRef idx="2">
+              <a:effectRef idx="0">
                 <a:schemeClr val="accent1"/>
               </a:effectRef>
               <a:fontRef idx="minor">
@@ -3272,116 +3269,305 @@
               <a:lstStyle/>
               <a:p>
                 <a:pPr algn="ctr"/>
-                <a:endParaRPr lang="en-US"/>
+                <a:r>
+                  <a:rPr lang="en-US" dirty="0">
+                    <a:solidFill>
+                      <a:schemeClr val="tx1"/>
+                    </a:solidFill>
+                  </a:rPr>
+                  <a:t>User</a:t>
+                </a:r>
+                <a:endParaRPr lang="en-CA" dirty="0">
+                  <a:solidFill>
+                    <a:schemeClr val="tx1"/>
+                  </a:solidFill>
+                </a:endParaRPr>
               </a:p>
             </p:txBody>
           </p:sp>
           <p:sp>
             <p:nvSpPr>
-              <p:cNvPr id="9" name="TextBox 8"/>
-              <p:cNvSpPr txBox="1"/>
+              <p:cNvPr id="12" name="Rectangle 11">
+                <a:extLst>
+                  <a:ext uri="{FF2B5EF4-FFF2-40B4-BE49-F238E27FC236}">
+                    <a16:creationId xmlns:a16="http://schemas.microsoft.com/office/drawing/2014/main" id="{A60C4ABD-D8CA-8985-6C04-25F89B846514}"/>
+                  </a:ext>
+                </a:extLst>
+              </p:cNvPr>
+              <p:cNvSpPr/>
               <p:nvPr/>
             </p:nvSpPr>
             <p:spPr>
               <a:xfrm>
-                <a:off x="1673605" y="2052185"/>
-                <a:ext cx="762949" cy="461665"/>
+                <a:off x="4881392" y="2064847"/>
+                <a:ext cx="2806700" cy="900000"/>
               </a:xfrm>
               <a:prstGeom prst="rect">
                 <a:avLst/>
               </a:prstGeom>
               <a:noFill/>
+              <a:ln>
+                <a:solidFill>
+                  <a:schemeClr val="tx1"/>
+                </a:solidFill>
+              </a:ln>
             </p:spPr>
+            <p:style>
+              <a:lnRef idx="2">
+                <a:schemeClr val="accent1">
+                  <a:shade val="15000"/>
+                </a:schemeClr>
+              </a:lnRef>
+              <a:fillRef idx="1">
+                <a:schemeClr val="accent1"/>
+              </a:fillRef>
+              <a:effectRef idx="0">
+                <a:schemeClr val="accent1"/>
+              </a:effectRef>
+              <a:fontRef idx="minor">
+                <a:schemeClr val="lt1"/>
+              </a:fontRef>
+            </p:style>
             <p:txBody>
-              <a:bodyPr wrap="none" rtlCol="0">
-                <a:spAutoFit/>
-              </a:bodyPr>
+              <a:bodyPr rtlCol="0" anchor="ctr"/>
               <a:lstStyle/>
               <a:p>
+                <a:pPr algn="ctr"/>
                 <a:r>
-                  <a:rPr lang="en-US" sz="2400" dirty="0">
-                    <a:latin typeface="Times New Roman"/>
-                    <a:cs typeface="Times New Roman"/>
+                  <a:rPr lang="en-US" sz="1600" dirty="0">
+                    <a:solidFill>
+                      <a:schemeClr val="tx1"/>
+                    </a:solidFill>
                   </a:rPr>
-                  <a:t>User</a:t>
+                  <a:t>Image Feature Correspondence Software</a:t>
                 </a:r>
+                <a:endParaRPr lang="en-CA" sz="1600" dirty="0">
+                  <a:solidFill>
+                    <a:schemeClr val="tx1"/>
+                  </a:solidFill>
+                </a:endParaRPr>
               </a:p>
             </p:txBody>
           </p:sp>
+          <p:grpSp>
+            <p:nvGrpSpPr>
+              <p:cNvPr id="13" name="Group 12">
+                <a:extLst>
+                  <a:ext uri="{FF2B5EF4-FFF2-40B4-BE49-F238E27FC236}">
+                    <a16:creationId xmlns:a16="http://schemas.microsoft.com/office/drawing/2014/main" id="{58AA0536-FF82-C1E2-12D2-6A5BFCC6CB5F}"/>
+                  </a:ext>
+                </a:extLst>
+              </p:cNvPr>
+              <p:cNvGrpSpPr/>
+              <p:nvPr/>
+            </p:nvGrpSpPr>
+            <p:grpSpPr>
+              <a:xfrm>
+                <a:off x="2292611" y="2223563"/>
+                <a:ext cx="2588781" cy="291284"/>
+                <a:chOff x="2292611" y="2223563"/>
+                <a:chExt cx="2588781" cy="291284"/>
+              </a:xfrm>
+            </p:grpSpPr>
+            <p:cxnSp>
+              <p:nvCxnSpPr>
+                <p:cNvPr id="22" name="Straight Arrow Connector 21">
+                  <a:extLst>
+                    <a:ext uri="{FF2B5EF4-FFF2-40B4-BE49-F238E27FC236}">
+                      <a16:creationId xmlns:a16="http://schemas.microsoft.com/office/drawing/2014/main" id="{45212296-79F4-4B8E-408A-6C0B433C117F}"/>
+                    </a:ext>
+                  </a:extLst>
+                </p:cNvPr>
+                <p:cNvCxnSpPr>
+                  <a:cxnSpLocks/>
+                  <a:stCxn id="11" idx="6"/>
+                  <a:endCxn id="12" idx="1"/>
+                </p:cNvCxnSpPr>
+                <p:nvPr/>
+              </p:nvCxnSpPr>
+              <p:spPr>
+                <a:xfrm>
+                  <a:off x="2292611" y="2504973"/>
+                  <a:ext cx="2588781" cy="9874"/>
+                </a:xfrm>
+                <a:prstGeom prst="straightConnector1">
+                  <a:avLst/>
+                </a:prstGeom>
+                <a:ln>
+                  <a:tailEnd type="triangle"/>
+                </a:ln>
+              </p:spPr>
+              <p:style>
+                <a:lnRef idx="2">
+                  <a:schemeClr val="dk1"/>
+                </a:lnRef>
+                <a:fillRef idx="0">
+                  <a:schemeClr val="dk1"/>
+                </a:fillRef>
+                <a:effectRef idx="1">
+                  <a:schemeClr val="dk1"/>
+                </a:effectRef>
+                <a:fontRef idx="minor">
+                  <a:schemeClr val="tx1"/>
+                </a:fontRef>
+              </p:style>
+            </p:cxnSp>
+            <p:sp>
+              <p:nvSpPr>
+                <p:cNvPr id="23" name="TextBox 22">
+                  <a:extLst>
+                    <a:ext uri="{FF2B5EF4-FFF2-40B4-BE49-F238E27FC236}">
+                      <a16:creationId xmlns:a16="http://schemas.microsoft.com/office/drawing/2014/main" id="{98CA1F35-0FEA-D192-8E65-65C0FD974F0C}"/>
+                    </a:ext>
+                  </a:extLst>
+                </p:cNvPr>
+                <p:cNvSpPr txBox="1"/>
+                <p:nvPr/>
+              </p:nvSpPr>
+              <p:spPr>
+                <a:xfrm>
+                  <a:off x="2906722" y="2223563"/>
+                  <a:ext cx="1337733" cy="265529"/>
+                </a:xfrm>
+                <a:prstGeom prst="rect">
+                  <a:avLst/>
+                </a:prstGeom>
+                <a:noFill/>
+              </p:spPr>
+              <p:txBody>
+                <a:bodyPr wrap="square" rtlCol="0">
+                  <a:spAutoFit/>
+                </a:bodyPr>
+                <a:lstStyle/>
+                <a:p>
+                  <a:pPr algn="ctr"/>
+                  <a:r>
+                    <a:rPr lang="en-US" sz="1600" dirty="0"/>
+                    <a:t>Inputs</a:t>
+                  </a:r>
+                  <a:endParaRPr lang="en-CA" sz="1600" dirty="0"/>
+                </a:p>
+              </p:txBody>
+            </p:sp>
+          </p:grpSp>
+          <p:grpSp>
+            <p:nvGrpSpPr>
+              <p:cNvPr id="14" name="Group 13">
+                <a:extLst>
+                  <a:ext uri="{FF2B5EF4-FFF2-40B4-BE49-F238E27FC236}">
+                    <a16:creationId xmlns:a16="http://schemas.microsoft.com/office/drawing/2014/main" id="{97CC5421-9E22-554F-3922-190A4929B47D}"/>
+                  </a:ext>
+                </a:extLst>
+              </p:cNvPr>
+              <p:cNvGrpSpPr/>
+              <p:nvPr/>
+            </p:nvGrpSpPr>
+            <p:grpSpPr>
+              <a:xfrm>
+                <a:off x="7688092" y="2237848"/>
+                <a:ext cx="2496880" cy="277000"/>
+                <a:chOff x="7688092" y="2237848"/>
+                <a:chExt cx="2496880" cy="277000"/>
+              </a:xfrm>
+            </p:grpSpPr>
+            <p:cxnSp>
+              <p:nvCxnSpPr>
+                <p:cNvPr id="15" name="Straight Arrow Connector 14">
+                  <a:extLst>
+                    <a:ext uri="{FF2B5EF4-FFF2-40B4-BE49-F238E27FC236}">
+                      <a16:creationId xmlns:a16="http://schemas.microsoft.com/office/drawing/2014/main" id="{389111AA-14DE-EA40-22BB-5E147F6CC5E1}"/>
+                    </a:ext>
+                  </a:extLst>
+                </p:cNvPr>
+                <p:cNvCxnSpPr>
+                  <a:cxnSpLocks/>
+                  <a:stCxn id="12" idx="3"/>
+                  <a:endCxn id="3" idx="2"/>
+                </p:cNvCxnSpPr>
+                <p:nvPr/>
+              </p:nvCxnSpPr>
+              <p:spPr>
+                <a:xfrm>
+                  <a:off x="7688092" y="2514847"/>
+                  <a:ext cx="2496880" cy="1"/>
+                </a:xfrm>
+                <a:prstGeom prst="straightConnector1">
+                  <a:avLst/>
+                </a:prstGeom>
+                <a:ln>
+                  <a:tailEnd type="triangle"/>
+                </a:ln>
+              </p:spPr>
+              <p:style>
+                <a:lnRef idx="2">
+                  <a:schemeClr val="dk1"/>
+                </a:lnRef>
+                <a:fillRef idx="0">
+                  <a:schemeClr val="dk1"/>
+                </a:fillRef>
+                <a:effectRef idx="1">
+                  <a:schemeClr val="dk1"/>
+                </a:effectRef>
+                <a:fontRef idx="minor">
+                  <a:schemeClr val="tx1"/>
+                </a:fontRef>
+              </p:style>
+            </p:cxnSp>
+            <p:sp>
+              <p:nvSpPr>
+                <p:cNvPr id="16" name="TextBox 15">
+                  <a:extLst>
+                    <a:ext uri="{FF2B5EF4-FFF2-40B4-BE49-F238E27FC236}">
+                      <a16:creationId xmlns:a16="http://schemas.microsoft.com/office/drawing/2014/main" id="{1B576510-EBAB-DC02-E439-92CF6DE7CDB4}"/>
+                    </a:ext>
+                  </a:extLst>
+                </p:cNvPr>
+                <p:cNvSpPr txBox="1"/>
+                <p:nvPr/>
+              </p:nvSpPr>
+              <p:spPr>
+                <a:xfrm>
+                  <a:off x="8363955" y="2237848"/>
+                  <a:ext cx="1337733" cy="265529"/>
+                </a:xfrm>
+                <a:prstGeom prst="rect">
+                  <a:avLst/>
+                </a:prstGeom>
+                <a:noFill/>
+              </p:spPr>
+              <p:txBody>
+                <a:bodyPr wrap="square" rtlCol="0">
+                  <a:spAutoFit/>
+                </a:bodyPr>
+                <a:lstStyle/>
+                <a:p>
+                  <a:pPr algn="ctr"/>
+                  <a:r>
+                    <a:rPr lang="en-US" sz="1600" dirty="0"/>
+                    <a:t>Outputs</a:t>
+                  </a:r>
+                  <a:endParaRPr lang="en-CA" sz="1600" dirty="0"/>
+                </a:p>
+              </p:txBody>
+            </p:sp>
+          </p:grpSp>
         </p:grpSp>
-      </p:grpSp>
-      <p:grpSp>
-        <p:nvGrpSpPr>
-          <p:cNvPr id="20" name="Group 19"/>
-          <p:cNvGrpSpPr/>
-          <p:nvPr/>
-        </p:nvGrpSpPr>
-        <p:grpSpPr>
-          <a:xfrm>
-            <a:off x="3096989" y="2868373"/>
-            <a:ext cx="3035986" cy="1246370"/>
-            <a:chOff x="2914805" y="1721177"/>
-            <a:chExt cx="3035986" cy="1246370"/>
-          </a:xfrm>
-        </p:grpSpPr>
         <p:sp>
           <p:nvSpPr>
-            <p:cNvPr id="18" name="Rectangle 17"/>
-            <p:cNvSpPr/>
-            <p:nvPr/>
-          </p:nvSpPr>
-          <p:spPr>
-            <a:xfrm>
-              <a:off x="2914805" y="1721177"/>
-              <a:ext cx="3035986" cy="1246370"/>
-            </a:xfrm>
-            <a:prstGeom prst="rect">
-              <a:avLst/>
-            </a:prstGeom>
-            <a:noFill/>
-            <a:ln w="38100" cmpd="sng">
-              <a:solidFill>
-                <a:schemeClr val="tx1"/>
-              </a:solidFill>
-            </a:ln>
-            <a:effectLst/>
-          </p:spPr>
-          <p:style>
-            <a:lnRef idx="1">
-              <a:schemeClr val="accent1"/>
-            </a:lnRef>
-            <a:fillRef idx="3">
-              <a:schemeClr val="accent1"/>
-            </a:fillRef>
-            <a:effectRef idx="2">
-              <a:schemeClr val="accent1"/>
-            </a:effectRef>
-            <a:fontRef idx="minor">
-              <a:schemeClr val="lt1"/>
-            </a:fontRef>
-          </p:style>
-          <p:txBody>
-            <a:bodyPr rtlCol="0" anchor="t"/>
-            <a:lstStyle/>
-            <a:p>
-              <a:pPr algn="ctr"/>
-              <a:r>
-                <a:rPr lang="en-US"/>
-                <a:t>`</a:t>
-              </a:r>
-            </a:p>
-          </p:txBody>
-        </p:sp>
-        <p:sp>
-          <p:nvSpPr>
-            <p:cNvPr id="19" name="TextBox 18"/>
+            <p:cNvPr id="24" name="TextBox 23">
+              <a:extLst>
+                <a:ext uri="{FF2B5EF4-FFF2-40B4-BE49-F238E27FC236}">
+                  <a16:creationId xmlns:a16="http://schemas.microsoft.com/office/drawing/2014/main" id="{8408D74B-D588-AB48-23FE-13CBBE97D515}"/>
+                </a:ext>
+              </a:extLst>
+            </p:cNvPr>
             <p:cNvSpPr txBox="1"/>
             <p:nvPr/>
           </p:nvSpPr>
           <p:spPr>
             <a:xfrm>
-              <a:off x="3087122" y="1874089"/>
-              <a:ext cx="2755080" cy="830997"/>
+              <a:off x="2484137" y="3200724"/>
+              <a:ext cx="2510725" cy="2003538"/>
             </a:xfrm>
             <a:prstGeom prst="rect">
               <a:avLst/>
@@ -3389,93 +3575,146 @@
             <a:noFill/>
           </p:spPr>
           <p:txBody>
-            <a:bodyPr wrap="square" rtlCol="0" anchor="t">
+            <a:bodyPr wrap="square" rtlCol="0">
               <a:spAutoFit/>
             </a:bodyPr>
             <a:lstStyle/>
             <a:p>
+              <a:pPr marL="171450" indent="-171450">
+                <a:buFont typeface="Arial" panose="020B0604020202020204" pitchFamily="34" charset="0"/>
+                <a:buChar char="•"/>
+              </a:pPr>
               <a:r>
-                <a:rPr lang="en-US" sz="2400" dirty="0">
-                  <a:latin typeface="Times New Roman"/>
-                  <a:cs typeface="Times New Roman"/>
-                </a:rPr>
-                <a:t>Image Feature Correspondences</a:t>
+                <a:rPr lang="en-US" sz="1600" dirty="0"/>
+                <a:t>Raw Imagery (.jpg, .</a:t>
               </a:r>
+              <a:r>
+                <a:rPr lang="en-US" sz="1600" dirty="0" err="1"/>
+                <a:t>png</a:t>
+              </a:r>
+              <a:r>
+                <a:rPr lang="en-US" sz="1600" dirty="0"/>
+                <a:t>)</a:t>
+              </a:r>
+            </a:p>
+            <a:p>
+              <a:pPr marL="171450" indent="-171450">
+                <a:buFont typeface="Arial" panose="020B0604020202020204" pitchFamily="34" charset="0"/>
+                <a:buChar char="•"/>
+              </a:pPr>
+              <a:r>
+                <a:rPr lang="en-US" sz="1600" dirty="0"/>
+                <a:t>Image Smoothing Method</a:t>
+              </a:r>
+            </a:p>
+            <a:p>
+              <a:pPr marL="628650" lvl="1" indent="-171450">
+                <a:buFont typeface="Arial" panose="020B0604020202020204" pitchFamily="34" charset="0"/>
+                <a:buChar char="•"/>
+              </a:pPr>
+              <a:r>
+                <a:rPr lang="en-US" sz="1600" dirty="0"/>
+                <a:t>Kernel Size</a:t>
+              </a:r>
+            </a:p>
+            <a:p>
+              <a:pPr marL="628650" lvl="1" indent="-171450">
+                <a:buFont typeface="Arial" panose="020B0604020202020204" pitchFamily="34" charset="0"/>
+                <a:buChar char="•"/>
+              </a:pPr>
+              <a:r>
+                <a:rPr lang="en-US" sz="1600" dirty="0"/>
+                <a:t>Standard Distribution</a:t>
+              </a:r>
+            </a:p>
+            <a:p>
+              <a:pPr marL="171450" indent="-171450">
+                <a:buFont typeface="Arial" panose="020B0604020202020204" pitchFamily="34" charset="0"/>
+                <a:buChar char="•"/>
+              </a:pPr>
+              <a:r>
+                <a:rPr lang="en-US" sz="1600" dirty="0" err="1"/>
+                <a:t>Keypoint</a:t>
+              </a:r>
+              <a:r>
+                <a:rPr lang="en-US" sz="1600" dirty="0"/>
+                <a:t> Detection Method</a:t>
+              </a:r>
+            </a:p>
+            <a:p>
+              <a:pPr marL="628650" lvl="1" indent="-171450">
+                <a:buFont typeface="Arial" panose="020B0604020202020204" pitchFamily="34" charset="0"/>
+                <a:buChar char="•"/>
+              </a:pPr>
+              <a:r>
+                <a:rPr lang="en-US" sz="1600" dirty="0" err="1"/>
+                <a:t>Keypoint</a:t>
+              </a:r>
+              <a:r>
+                <a:rPr lang="en-US" sz="1600" dirty="0"/>
+                <a:t> Threshold Criteria</a:t>
+              </a:r>
+            </a:p>
+            <a:p>
+              <a:pPr marL="171450" indent="-171450">
+                <a:buFont typeface="Arial" panose="020B0604020202020204" pitchFamily="34" charset="0"/>
+                <a:buChar char="•"/>
+              </a:pPr>
+              <a:r>
+                <a:rPr lang="en-US" sz="1600" dirty="0"/>
+                <a:t>Feature Detection Method</a:t>
+              </a:r>
+            </a:p>
+            <a:p>
+              <a:pPr marL="628650" lvl="1" indent="-171450">
+                <a:buFont typeface="Arial" panose="020B0604020202020204" pitchFamily="34" charset="0"/>
+                <a:buChar char="•"/>
+              </a:pPr>
+              <a:r>
+                <a:rPr lang="en-US" sz="1600" dirty="0"/>
+                <a:t>Binary or Float Descriptors</a:t>
+              </a:r>
+            </a:p>
+            <a:p>
+              <a:pPr marL="171450" indent="-171450">
+                <a:buFont typeface="Arial" panose="020B0604020202020204" pitchFamily="34" charset="0"/>
+                <a:buChar char="•"/>
+              </a:pPr>
+              <a:r>
+                <a:rPr lang="en-US" sz="1600" dirty="0"/>
+                <a:t>Feature Matching Method</a:t>
+              </a:r>
+              <a:endParaRPr lang="en-CA" sz="1600" dirty="0"/>
+            </a:p>
+            <a:p>
+              <a:pPr marL="628650" lvl="1" indent="-171450">
+                <a:buFont typeface="Arial" panose="020B0604020202020204" pitchFamily="34" charset="0"/>
+                <a:buChar char="•"/>
+              </a:pPr>
+              <a:r>
+                <a:rPr lang="en-CA" sz="1600" dirty="0"/>
+                <a:t>Permissible Distance Limit</a:t>
+              </a:r>
+              <a:endParaRPr lang="en-US" sz="1600" dirty="0"/>
             </a:p>
           </p:txBody>
         </p:sp>
-      </p:grpSp>
-      <p:grpSp>
-        <p:nvGrpSpPr>
-          <p:cNvPr id="17" name="Group 16">
-            <a:extLst>
-              <a:ext uri="{FF2B5EF4-FFF2-40B4-BE49-F238E27FC236}">
-                <a16:creationId xmlns:a16="http://schemas.microsoft.com/office/drawing/2014/main" id="{1477B054-9C7B-9FAB-C6A1-EFCFE9751301}"/>
-              </a:ext>
-            </a:extLst>
-          </p:cNvPr>
-          <p:cNvGrpSpPr/>
-          <p:nvPr/>
-        </p:nvGrpSpPr>
-        <p:grpSpPr>
-          <a:xfrm>
-            <a:off x="1436215" y="3064823"/>
-            <a:ext cx="1660774" cy="433306"/>
-            <a:chOff x="1436215" y="3064823"/>
-            <a:chExt cx="1660774" cy="433306"/>
-          </a:xfrm>
-        </p:grpSpPr>
-        <p:cxnSp>
-          <p:nvCxnSpPr>
-            <p:cNvPr id="25" name="Straight Arrow Connector 24"/>
-            <p:cNvCxnSpPr>
-              <a:cxnSpLocks/>
-              <a:stCxn id="4" idx="6"/>
-              <a:endCxn id="18" idx="1"/>
-            </p:cNvCxnSpPr>
-            <p:nvPr/>
-          </p:nvCxnSpPr>
-          <p:spPr>
-            <a:xfrm flipV="1">
-              <a:off x="1436215" y="3491558"/>
-              <a:ext cx="1660774" cy="6571"/>
-            </a:xfrm>
-            <a:prstGeom prst="straightConnector1">
-              <a:avLst/>
-            </a:prstGeom>
-            <a:ln w="38100" cmpd="sng">
-              <a:solidFill>
-                <a:schemeClr val="tx1"/>
-              </a:solidFill>
-              <a:tailEnd type="arrow"/>
-            </a:ln>
-            <a:effectLst/>
-          </p:spPr>
-          <p:style>
-            <a:lnRef idx="2">
-              <a:schemeClr val="accent1"/>
-            </a:lnRef>
-            <a:fillRef idx="0">
-              <a:schemeClr val="accent1"/>
-            </a:fillRef>
-            <a:effectRef idx="1">
-              <a:schemeClr val="accent1"/>
-            </a:effectRef>
-            <a:fontRef idx="minor">
-              <a:schemeClr val="tx1"/>
-            </a:fontRef>
-          </p:style>
-        </p:cxnSp>
         <p:sp>
           <p:nvSpPr>
-            <p:cNvPr id="34" name="TextBox 33"/>
+            <p:cNvPr id="26" name="TextBox 25">
+              <a:extLst>
+                <a:ext uri="{FF2B5EF4-FFF2-40B4-BE49-F238E27FC236}">
+                  <a16:creationId xmlns:a16="http://schemas.microsoft.com/office/drawing/2014/main" id="{8B2459EF-05D9-7621-0527-0C2B036FF9BE}"/>
+                </a:ext>
+              </a:extLst>
+            </p:cNvPr>
             <p:cNvSpPr txBox="1"/>
             <p:nvPr/>
           </p:nvSpPr>
           <p:spPr>
             <a:xfrm>
-              <a:off x="1745191" y="3064823"/>
-              <a:ext cx="1114408" cy="369332"/>
+              <a:off x="7508183" y="3172204"/>
+              <a:ext cx="2510725" cy="1037978"/>
             </a:xfrm>
             <a:prstGeom prst="rect">
               <a:avLst/>
@@ -3483,110 +3722,61 @@
             <a:noFill/>
           </p:spPr>
           <p:txBody>
-            <a:bodyPr wrap="none" rtlCol="0">
+            <a:bodyPr wrap="square" rtlCol="0">
               <a:spAutoFit/>
             </a:bodyPr>
             <a:lstStyle/>
             <a:p>
+              <a:pPr marL="171450" indent="-171450">
+                <a:buFont typeface="Arial" panose="020B0604020202020204" pitchFamily="34" charset="0"/>
+                <a:buChar char="•"/>
+              </a:pPr>
               <a:r>
-                <a:rPr lang="en-US" dirty="0">
-                  <a:latin typeface="Times New Roman"/>
-                  <a:cs typeface="Times New Roman"/>
-                </a:rPr>
-                <a:t>Inputs: …</a:t>
+                <a:rPr lang="en-US" sz="1600" dirty="0"/>
+                <a:t>Smoothed imagery (.</a:t>
+              </a:r>
+              <a:r>
+                <a:rPr lang="en-US" sz="1600" dirty="0" err="1"/>
+                <a:t>png</a:t>
+              </a:r>
+              <a:r>
+                <a:rPr lang="en-US" sz="1600" dirty="0"/>
+                <a:t>)</a:t>
               </a:r>
             </a:p>
-          </p:txBody>
-        </p:sp>
-      </p:grpSp>
-      <p:grpSp>
-        <p:nvGrpSpPr>
-          <p:cNvPr id="21" name="Group 20">
-            <a:extLst>
-              <a:ext uri="{FF2B5EF4-FFF2-40B4-BE49-F238E27FC236}">
-                <a16:creationId xmlns:a16="http://schemas.microsoft.com/office/drawing/2014/main" id="{8CC0F1F7-B551-22EA-4A37-057A0B3029AA}"/>
-              </a:ext>
-            </a:extLst>
-          </p:cNvPr>
-          <p:cNvGrpSpPr/>
-          <p:nvPr/>
-        </p:nvGrpSpPr>
-        <p:grpSpPr>
-          <a:xfrm>
-            <a:off x="6132124" y="3116045"/>
-            <a:ext cx="1670198" cy="382084"/>
-            <a:chOff x="6132124" y="3116045"/>
-            <a:chExt cx="1670198" cy="382084"/>
-          </a:xfrm>
-        </p:grpSpPr>
-        <p:cxnSp>
-          <p:nvCxnSpPr>
-            <p:cNvPr id="27" name="Straight Arrow Connector 26"/>
-            <p:cNvCxnSpPr>
-              <a:cxnSpLocks/>
-              <a:endCxn id="8" idx="2"/>
-            </p:cNvCxnSpPr>
-            <p:nvPr/>
-          </p:nvCxnSpPr>
-          <p:spPr>
-            <a:xfrm>
-              <a:off x="6132124" y="3498129"/>
-              <a:ext cx="1670198" cy="0"/>
-            </a:xfrm>
-            <a:prstGeom prst="straightConnector1">
-              <a:avLst/>
-            </a:prstGeom>
-            <a:ln w="38100" cmpd="sng">
-              <a:solidFill>
-                <a:schemeClr val="tx1"/>
-              </a:solidFill>
-              <a:tailEnd type="arrow"/>
-            </a:ln>
-            <a:effectLst/>
-          </p:spPr>
-          <p:style>
-            <a:lnRef idx="2">
-              <a:schemeClr val="accent1"/>
-            </a:lnRef>
-            <a:fillRef idx="0">
-              <a:schemeClr val="accent1"/>
-            </a:fillRef>
-            <a:effectRef idx="1">
-              <a:schemeClr val="accent1"/>
-            </a:effectRef>
-            <a:fontRef idx="minor">
-              <a:schemeClr val="tx1"/>
-            </a:fontRef>
-          </p:style>
-        </p:cxnSp>
-        <p:sp>
-          <p:nvSpPr>
-            <p:cNvPr id="35" name="TextBox 34"/>
-            <p:cNvSpPr txBox="1"/>
-            <p:nvPr/>
-          </p:nvSpPr>
-          <p:spPr>
-            <a:xfrm>
-              <a:off x="6426288" y="3116045"/>
-              <a:ext cx="1268296" cy="369332"/>
-            </a:xfrm>
-            <a:prstGeom prst="rect">
-              <a:avLst/>
-            </a:prstGeom>
-            <a:noFill/>
-          </p:spPr>
-          <p:txBody>
-            <a:bodyPr wrap="none" rtlCol="0">
-              <a:spAutoFit/>
-            </a:bodyPr>
-            <a:lstStyle/>
             <a:p>
+              <a:pPr marL="171450" indent="-171450">
+                <a:buFont typeface="Arial" panose="020B0604020202020204" pitchFamily="34" charset="0"/>
+                <a:buChar char="•"/>
+              </a:pPr>
               <a:r>
-                <a:rPr lang="en-US" dirty="0">
-                  <a:latin typeface="Times New Roman"/>
-                  <a:cs typeface="Times New Roman"/>
-                </a:rPr>
-                <a:t>Outputs: …</a:t>
+                <a:rPr lang="en-US" sz="1600" dirty="0"/>
+                <a:t>Identified </a:t>
+              </a:r>
+              <a:r>
+                <a:rPr lang="en-US" sz="1600" dirty="0" err="1"/>
+                <a:t>keypoints</a:t>
+              </a:r>
+              <a:endParaRPr lang="en-US" sz="1600" dirty="0"/>
+            </a:p>
+            <a:p>
+              <a:pPr marL="171450" indent="-171450">
+                <a:buFont typeface="Arial" panose="020B0604020202020204" pitchFamily="34" charset="0"/>
+                <a:buChar char="•"/>
+              </a:pPr>
+              <a:r>
+                <a:rPr lang="en-US" sz="1600" dirty="0"/>
+                <a:t>Defined Descriptors</a:t>
+              </a:r>
+            </a:p>
+            <a:p>
+              <a:pPr marL="171450" indent="-171450">
+                <a:buFont typeface="Arial" panose="020B0604020202020204" pitchFamily="34" charset="0"/>
+                <a:buChar char="•"/>
+              </a:pPr>
+              <a:r>
+                <a:rPr lang="en-US" sz="1600" dirty="0"/>
+                <a:t>Candidate descriptor matches between images</a:t>
               </a:r>
             </a:p>
           </p:txBody>

</xml_diff>